<commit_message>
some of the coding intro
Signed-off-by: Jeff Goeders <jeff.goeders@gmail.com>
</commit_message>
<xml_diff>
--- a/_media_srcs/images.pptx
+++ b/_media_srcs/images.pptx
@@ -7,6 +7,7 @@
   <p:sldIdLst>
     <p:sldId id="256" r:id="rId2"/>
     <p:sldId id="257" r:id="rId3"/>
+    <p:sldId id="258" r:id="rId4"/>
   </p:sldIdLst>
   <p:sldSz cx="12192000" cy="6858000"/>
   <p:notesSz cx="6858000" cy="9144000"/>
@@ -260,7 +261,7 @@
           <a:p>
             <a:fld id="{02B29F35-8620-47AD-B506-1B772581C455}" type="datetimeFigureOut">
               <a:rPr lang="en-US" smtClean="0"/>
-              <a:t>5/3/2023</a:t>
+              <a:t>5/4/2023</a:t>
             </a:fld>
             <a:endParaRPr lang="en-US"/>
           </a:p>
@@ -458,7 +459,7 @@
           <a:p>
             <a:fld id="{02B29F35-8620-47AD-B506-1B772581C455}" type="datetimeFigureOut">
               <a:rPr lang="en-US" smtClean="0"/>
-              <a:t>5/3/2023</a:t>
+              <a:t>5/4/2023</a:t>
             </a:fld>
             <a:endParaRPr lang="en-US"/>
           </a:p>
@@ -666,7 +667,7 @@
           <a:p>
             <a:fld id="{02B29F35-8620-47AD-B506-1B772581C455}" type="datetimeFigureOut">
               <a:rPr lang="en-US" smtClean="0"/>
-              <a:t>5/3/2023</a:t>
+              <a:t>5/4/2023</a:t>
             </a:fld>
             <a:endParaRPr lang="en-US"/>
           </a:p>
@@ -864,7 +865,7 @@
           <a:p>
             <a:fld id="{02B29F35-8620-47AD-B506-1B772581C455}" type="datetimeFigureOut">
               <a:rPr lang="en-US" smtClean="0"/>
-              <a:t>5/3/2023</a:t>
+              <a:t>5/4/2023</a:t>
             </a:fld>
             <a:endParaRPr lang="en-US"/>
           </a:p>
@@ -1139,7 +1140,7 @@
           <a:p>
             <a:fld id="{02B29F35-8620-47AD-B506-1B772581C455}" type="datetimeFigureOut">
               <a:rPr lang="en-US" smtClean="0"/>
-              <a:t>5/3/2023</a:t>
+              <a:t>5/4/2023</a:t>
             </a:fld>
             <a:endParaRPr lang="en-US"/>
           </a:p>
@@ -1404,7 +1405,7 @@
           <a:p>
             <a:fld id="{02B29F35-8620-47AD-B506-1B772581C455}" type="datetimeFigureOut">
               <a:rPr lang="en-US" smtClean="0"/>
-              <a:t>5/3/2023</a:t>
+              <a:t>5/4/2023</a:t>
             </a:fld>
             <a:endParaRPr lang="en-US"/>
           </a:p>
@@ -1816,7 +1817,7 @@
           <a:p>
             <a:fld id="{02B29F35-8620-47AD-B506-1B772581C455}" type="datetimeFigureOut">
               <a:rPr lang="en-US" smtClean="0"/>
-              <a:t>5/3/2023</a:t>
+              <a:t>5/4/2023</a:t>
             </a:fld>
             <a:endParaRPr lang="en-US"/>
           </a:p>
@@ -1957,7 +1958,7 @@
           <a:p>
             <a:fld id="{02B29F35-8620-47AD-B506-1B772581C455}" type="datetimeFigureOut">
               <a:rPr lang="en-US" smtClean="0"/>
-              <a:t>5/3/2023</a:t>
+              <a:t>5/4/2023</a:t>
             </a:fld>
             <a:endParaRPr lang="en-US"/>
           </a:p>
@@ -2070,7 +2071,7 @@
           <a:p>
             <a:fld id="{02B29F35-8620-47AD-B506-1B772581C455}" type="datetimeFigureOut">
               <a:rPr lang="en-US" smtClean="0"/>
-              <a:t>5/3/2023</a:t>
+              <a:t>5/4/2023</a:t>
             </a:fld>
             <a:endParaRPr lang="en-US"/>
           </a:p>
@@ -2381,7 +2382,7 @@
           <a:p>
             <a:fld id="{02B29F35-8620-47AD-B506-1B772581C455}" type="datetimeFigureOut">
               <a:rPr lang="en-US" smtClean="0"/>
-              <a:t>5/3/2023</a:t>
+              <a:t>5/4/2023</a:t>
             </a:fld>
             <a:endParaRPr lang="en-US"/>
           </a:p>
@@ -2669,7 +2670,7 @@
           <a:p>
             <a:fld id="{02B29F35-8620-47AD-B506-1B772581C455}" type="datetimeFigureOut">
               <a:rPr lang="en-US" smtClean="0"/>
-              <a:t>5/3/2023</a:t>
+              <a:t>5/4/2023</a:t>
             </a:fld>
             <a:endParaRPr lang="en-US"/>
           </a:p>
@@ -2910,7 +2911,7 @@
           <a:p>
             <a:fld id="{02B29F35-8620-47AD-B506-1B772581C455}" type="datetimeFigureOut">
               <a:rPr lang="en-US" smtClean="0"/>
-              <a:t>5/3/2023</a:t>
+              <a:t>5/4/2023</a:t>
             </a:fld>
             <a:endParaRPr lang="en-US"/>
           </a:p>
@@ -3953,6 +3954,597 @@
 </p:sld>
 </file>
 
+<file path=ppt/slides/slide3.xml><?xml version="1.0" encoding="utf-8"?>
+<p:sld xmlns:a="http://schemas.openxmlformats.org/drawingml/2006/main" xmlns:r="http://schemas.openxmlformats.org/officeDocument/2006/relationships" xmlns:p="http://schemas.openxmlformats.org/presentationml/2006/main">
+  <p:cSld>
+    <p:spTree>
+      <p:nvGrpSpPr>
+        <p:cNvPr id="1" name=""/>
+        <p:cNvGrpSpPr/>
+        <p:nvPr/>
+      </p:nvGrpSpPr>
+      <p:grpSpPr>
+        <a:xfrm>
+          <a:off x="0" y="0"/>
+          <a:ext cx="0" cy="0"/>
+          <a:chOff x="0" y="0"/>
+          <a:chExt cx="0" cy="0"/>
+        </a:xfrm>
+      </p:grpSpPr>
+      <p:pic>
+        <p:nvPicPr>
+          <p:cNvPr id="11" name="Picture 10">
+            <a:extLst>
+              <a:ext uri="{FF2B5EF4-FFF2-40B4-BE49-F238E27FC236}">
+                <a16:creationId xmlns:a16="http://schemas.microsoft.com/office/drawing/2014/main" id="{DD53DD0A-0694-741E-6149-CEFA037D905A}"/>
+              </a:ext>
+            </a:extLst>
+          </p:cNvPr>
+          <p:cNvPicPr>
+            <a:picLocks noChangeAspect="1"/>
+          </p:cNvPicPr>
+          <p:nvPr/>
+        </p:nvPicPr>
+        <p:blipFill>
+          <a:blip r:embed="rId2"/>
+          <a:stretch>
+            <a:fillRect/>
+          </a:stretch>
+        </p:blipFill>
+        <p:spPr>
+          <a:xfrm>
+            <a:off x="1064454" y="749162"/>
+            <a:ext cx="4121362" cy="2679838"/>
+          </a:xfrm>
+          <a:prstGeom prst="rect">
+            <a:avLst/>
+          </a:prstGeom>
+        </p:spPr>
+      </p:pic>
+      <p:sp>
+        <p:nvSpPr>
+          <p:cNvPr id="14" name="Arrow: Curved Left 13">
+            <a:extLst>
+              <a:ext uri="{FF2B5EF4-FFF2-40B4-BE49-F238E27FC236}">
+                <a16:creationId xmlns:a16="http://schemas.microsoft.com/office/drawing/2014/main" id="{6C5A1E6D-1598-88F3-1607-250DA1E5C27C}"/>
+              </a:ext>
+            </a:extLst>
+          </p:cNvPr>
+          <p:cNvSpPr/>
+          <p:nvPr/>
+        </p:nvSpPr>
+        <p:spPr>
+          <a:xfrm flipH="1">
+            <a:off x="956659" y="2692357"/>
+            <a:ext cx="215590" cy="644660"/>
+          </a:xfrm>
+          <a:prstGeom prst="curvedLeftArrow">
+            <a:avLst>
+              <a:gd name="adj1" fmla="val 25000"/>
+              <a:gd name="adj2" fmla="val 86207"/>
+              <a:gd name="adj3" fmla="val 25000"/>
+            </a:avLst>
+          </a:prstGeom>
+          <a:solidFill>
+            <a:srgbClr val="FF0000"/>
+          </a:solidFill>
+          <a:ln>
+            <a:solidFill>
+              <a:srgbClr val="FF0000"/>
+            </a:solidFill>
+          </a:ln>
+        </p:spPr>
+        <p:style>
+          <a:lnRef idx="2">
+            <a:schemeClr val="accent1">
+              <a:shade val="50000"/>
+            </a:schemeClr>
+          </a:lnRef>
+          <a:fillRef idx="1">
+            <a:schemeClr val="accent1"/>
+          </a:fillRef>
+          <a:effectRef idx="0">
+            <a:schemeClr val="accent1"/>
+          </a:effectRef>
+          <a:fontRef idx="minor">
+            <a:schemeClr val="lt1"/>
+          </a:fontRef>
+        </p:style>
+        <p:txBody>
+          <a:bodyPr rtlCol="0" anchor="ctr"/>
+          <a:lstStyle/>
+          <a:p>
+            <a:pPr algn="ctr"/>
+            <a:endParaRPr lang="en-US">
+              <a:solidFill>
+                <a:schemeClr val="tx1"/>
+              </a:solidFill>
+            </a:endParaRPr>
+          </a:p>
+        </p:txBody>
+      </p:sp>
+      <p:sp>
+        <p:nvSpPr>
+          <p:cNvPr id="13" name="Arrow: Curved Left 12">
+            <a:extLst>
+              <a:ext uri="{FF2B5EF4-FFF2-40B4-BE49-F238E27FC236}">
+                <a16:creationId xmlns:a16="http://schemas.microsoft.com/office/drawing/2014/main" id="{9E08961D-3C96-5BB3-9DE7-66BE530BEF1A}"/>
+              </a:ext>
+            </a:extLst>
+          </p:cNvPr>
+          <p:cNvSpPr/>
+          <p:nvPr/>
+        </p:nvSpPr>
+        <p:spPr>
+          <a:xfrm flipH="1">
+            <a:off x="956659" y="2444491"/>
+            <a:ext cx="215590" cy="378068"/>
+          </a:xfrm>
+          <a:prstGeom prst="curvedLeftArrow">
+            <a:avLst>
+              <a:gd name="adj1" fmla="val 25000"/>
+              <a:gd name="adj2" fmla="val 86207"/>
+              <a:gd name="adj3" fmla="val 25000"/>
+            </a:avLst>
+          </a:prstGeom>
+          <a:solidFill>
+            <a:srgbClr val="FF0000"/>
+          </a:solidFill>
+          <a:ln>
+            <a:solidFill>
+              <a:srgbClr val="FF0000"/>
+            </a:solidFill>
+          </a:ln>
+        </p:spPr>
+        <p:style>
+          <a:lnRef idx="2">
+            <a:schemeClr val="accent1">
+              <a:shade val="50000"/>
+            </a:schemeClr>
+          </a:lnRef>
+          <a:fillRef idx="1">
+            <a:schemeClr val="accent1"/>
+          </a:fillRef>
+          <a:effectRef idx="0">
+            <a:schemeClr val="accent1"/>
+          </a:effectRef>
+          <a:fontRef idx="minor">
+            <a:schemeClr val="lt1"/>
+          </a:fontRef>
+        </p:style>
+        <p:txBody>
+          <a:bodyPr rtlCol="0" anchor="ctr"/>
+          <a:lstStyle/>
+          <a:p>
+            <a:pPr algn="ctr"/>
+            <a:endParaRPr lang="en-US">
+              <a:solidFill>
+                <a:schemeClr val="tx1"/>
+              </a:solidFill>
+            </a:endParaRPr>
+          </a:p>
+        </p:txBody>
+      </p:sp>
+      <p:sp>
+        <p:nvSpPr>
+          <p:cNvPr id="9" name="Arrow: Curved Left 8">
+            <a:extLst>
+              <a:ext uri="{FF2B5EF4-FFF2-40B4-BE49-F238E27FC236}">
+                <a16:creationId xmlns:a16="http://schemas.microsoft.com/office/drawing/2014/main" id="{C7221F94-3020-C7E7-4AA0-5335EDCF902B}"/>
+              </a:ext>
+            </a:extLst>
+          </p:cNvPr>
+          <p:cNvSpPr/>
+          <p:nvPr/>
+        </p:nvSpPr>
+        <p:spPr>
+          <a:xfrm flipH="1">
+            <a:off x="956659" y="1902192"/>
+            <a:ext cx="215590" cy="644661"/>
+          </a:xfrm>
+          <a:prstGeom prst="curvedLeftArrow">
+            <a:avLst>
+              <a:gd name="adj1" fmla="val 25000"/>
+              <a:gd name="adj2" fmla="val 86207"/>
+              <a:gd name="adj3" fmla="val 25000"/>
+            </a:avLst>
+          </a:prstGeom>
+          <a:solidFill>
+            <a:srgbClr val="FF0000"/>
+          </a:solidFill>
+          <a:ln>
+            <a:solidFill>
+              <a:srgbClr val="FF0000"/>
+            </a:solidFill>
+          </a:ln>
+        </p:spPr>
+        <p:style>
+          <a:lnRef idx="2">
+            <a:schemeClr val="accent1">
+              <a:shade val="50000"/>
+            </a:schemeClr>
+          </a:lnRef>
+          <a:fillRef idx="1">
+            <a:schemeClr val="accent1"/>
+          </a:fillRef>
+          <a:effectRef idx="0">
+            <a:schemeClr val="accent1"/>
+          </a:effectRef>
+          <a:fontRef idx="minor">
+            <a:schemeClr val="lt1"/>
+          </a:fontRef>
+        </p:style>
+        <p:txBody>
+          <a:bodyPr rtlCol="0" anchor="ctr"/>
+          <a:lstStyle/>
+          <a:p>
+            <a:pPr algn="ctr"/>
+            <a:endParaRPr lang="en-US">
+              <a:solidFill>
+                <a:schemeClr val="tx1"/>
+              </a:solidFill>
+            </a:endParaRPr>
+          </a:p>
+        </p:txBody>
+      </p:sp>
+      <p:sp>
+        <p:nvSpPr>
+          <p:cNvPr id="8" name="Arrow: Curved Left 7">
+            <a:extLst>
+              <a:ext uri="{FF2B5EF4-FFF2-40B4-BE49-F238E27FC236}">
+                <a16:creationId xmlns:a16="http://schemas.microsoft.com/office/drawing/2014/main" id="{AFA85234-1733-8CD9-90B0-54FAB2FF3555}"/>
+              </a:ext>
+            </a:extLst>
+          </p:cNvPr>
+          <p:cNvSpPr/>
+          <p:nvPr/>
+        </p:nvSpPr>
+        <p:spPr>
+          <a:xfrm flipH="1">
+            <a:off x="956659" y="1374556"/>
+            <a:ext cx="215590" cy="644662"/>
+          </a:xfrm>
+          <a:prstGeom prst="curvedLeftArrow">
+            <a:avLst>
+              <a:gd name="adj1" fmla="val 25000"/>
+              <a:gd name="adj2" fmla="val 86207"/>
+              <a:gd name="adj3" fmla="val 25000"/>
+            </a:avLst>
+          </a:prstGeom>
+          <a:solidFill>
+            <a:srgbClr val="FF0000"/>
+          </a:solidFill>
+          <a:ln>
+            <a:solidFill>
+              <a:srgbClr val="FF0000"/>
+            </a:solidFill>
+          </a:ln>
+        </p:spPr>
+        <p:style>
+          <a:lnRef idx="2">
+            <a:schemeClr val="accent1">
+              <a:shade val="50000"/>
+            </a:schemeClr>
+          </a:lnRef>
+          <a:fillRef idx="1">
+            <a:schemeClr val="accent1"/>
+          </a:fillRef>
+          <a:effectRef idx="0">
+            <a:schemeClr val="accent1"/>
+          </a:effectRef>
+          <a:fontRef idx="minor">
+            <a:schemeClr val="lt1"/>
+          </a:fontRef>
+        </p:style>
+        <p:txBody>
+          <a:bodyPr rtlCol="0" anchor="ctr"/>
+          <a:lstStyle/>
+          <a:p>
+            <a:pPr algn="ctr"/>
+            <a:endParaRPr lang="en-US">
+              <a:solidFill>
+                <a:schemeClr val="tx1"/>
+              </a:solidFill>
+            </a:endParaRPr>
+          </a:p>
+        </p:txBody>
+      </p:sp>
+      <p:sp>
+        <p:nvSpPr>
+          <p:cNvPr id="7" name="Arrow: Curved Left 6">
+            <a:extLst>
+              <a:ext uri="{FF2B5EF4-FFF2-40B4-BE49-F238E27FC236}">
+                <a16:creationId xmlns:a16="http://schemas.microsoft.com/office/drawing/2014/main" id="{A23B162C-0040-AAEE-F94D-9CE5ADCAFB72}"/>
+              </a:ext>
+            </a:extLst>
+          </p:cNvPr>
+          <p:cNvSpPr/>
+          <p:nvPr/>
+        </p:nvSpPr>
+        <p:spPr>
+          <a:xfrm flipH="1">
+            <a:off x="956659" y="1105212"/>
+            <a:ext cx="215590" cy="371708"/>
+          </a:xfrm>
+          <a:prstGeom prst="curvedLeftArrow">
+            <a:avLst>
+              <a:gd name="adj1" fmla="val 25000"/>
+              <a:gd name="adj2" fmla="val 86207"/>
+              <a:gd name="adj3" fmla="val 25000"/>
+            </a:avLst>
+          </a:prstGeom>
+          <a:solidFill>
+            <a:srgbClr val="FF0000"/>
+          </a:solidFill>
+          <a:ln>
+            <a:solidFill>
+              <a:srgbClr val="FF0000"/>
+            </a:solidFill>
+          </a:ln>
+        </p:spPr>
+        <p:style>
+          <a:lnRef idx="2">
+            <a:schemeClr val="accent1">
+              <a:shade val="50000"/>
+            </a:schemeClr>
+          </a:lnRef>
+          <a:fillRef idx="1">
+            <a:schemeClr val="accent1"/>
+          </a:fillRef>
+          <a:effectRef idx="0">
+            <a:schemeClr val="accent1"/>
+          </a:effectRef>
+          <a:fontRef idx="minor">
+            <a:schemeClr val="lt1"/>
+          </a:fontRef>
+        </p:style>
+        <p:txBody>
+          <a:bodyPr rtlCol="0" anchor="ctr"/>
+          <a:lstStyle/>
+          <a:p>
+            <a:pPr algn="ctr"/>
+            <a:endParaRPr lang="en-US">
+              <a:solidFill>
+                <a:schemeClr val="tx1"/>
+              </a:solidFill>
+            </a:endParaRPr>
+          </a:p>
+        </p:txBody>
+      </p:sp>
+      <p:sp>
+        <p:nvSpPr>
+          <p:cNvPr id="6" name="Arrow: Curved Left 5">
+            <a:extLst>
+              <a:ext uri="{FF2B5EF4-FFF2-40B4-BE49-F238E27FC236}">
+                <a16:creationId xmlns:a16="http://schemas.microsoft.com/office/drawing/2014/main" id="{9DF4D3F6-5686-AFFF-1B3B-5ECCD0FC3A4F}"/>
+              </a:ext>
+            </a:extLst>
+          </p:cNvPr>
+          <p:cNvSpPr/>
+          <p:nvPr/>
+        </p:nvSpPr>
+        <p:spPr>
+          <a:xfrm flipH="1">
+            <a:off x="956659" y="843135"/>
+            <a:ext cx="215590" cy="371708"/>
+          </a:xfrm>
+          <a:prstGeom prst="curvedLeftArrow">
+            <a:avLst>
+              <a:gd name="adj1" fmla="val 25000"/>
+              <a:gd name="adj2" fmla="val 86207"/>
+              <a:gd name="adj3" fmla="val 25000"/>
+            </a:avLst>
+          </a:prstGeom>
+          <a:solidFill>
+            <a:srgbClr val="FF0000"/>
+          </a:solidFill>
+          <a:ln>
+            <a:solidFill>
+              <a:srgbClr val="FF0000"/>
+            </a:solidFill>
+          </a:ln>
+        </p:spPr>
+        <p:style>
+          <a:lnRef idx="2">
+            <a:schemeClr val="accent1">
+              <a:shade val="50000"/>
+            </a:schemeClr>
+          </a:lnRef>
+          <a:fillRef idx="1">
+            <a:schemeClr val="accent1"/>
+          </a:fillRef>
+          <a:effectRef idx="0">
+            <a:schemeClr val="accent1"/>
+          </a:effectRef>
+          <a:fontRef idx="minor">
+            <a:schemeClr val="lt1"/>
+          </a:fontRef>
+        </p:style>
+        <p:txBody>
+          <a:bodyPr rtlCol="0" anchor="ctr"/>
+          <a:lstStyle/>
+          <a:p>
+            <a:pPr algn="ctr"/>
+            <a:endParaRPr lang="en-US">
+              <a:solidFill>
+                <a:schemeClr val="tx1"/>
+              </a:solidFill>
+            </a:endParaRPr>
+          </a:p>
+        </p:txBody>
+      </p:sp>
+      <p:pic>
+        <p:nvPicPr>
+          <p:cNvPr id="15" name="Picture 14">
+            <a:extLst>
+              <a:ext uri="{FF2B5EF4-FFF2-40B4-BE49-F238E27FC236}">
+                <a16:creationId xmlns:a16="http://schemas.microsoft.com/office/drawing/2014/main" id="{C32C4BF1-5158-EC43-B571-666D504B608C}"/>
+              </a:ext>
+            </a:extLst>
+          </p:cNvPr>
+          <p:cNvPicPr>
+            <a:picLocks noChangeAspect="1"/>
+          </p:cNvPicPr>
+          <p:nvPr/>
+        </p:nvPicPr>
+        <p:blipFill rotWithShape="1">
+          <a:blip r:embed="rId2"/>
+          <a:srcRect b="66465"/>
+          <a:stretch/>
+        </p:blipFill>
+        <p:spPr>
+          <a:xfrm>
+            <a:off x="6006402" y="797489"/>
+            <a:ext cx="4121362" cy="898688"/>
+          </a:xfrm>
+          <a:prstGeom prst="rect">
+            <a:avLst/>
+          </a:prstGeom>
+        </p:spPr>
+      </p:pic>
+      <p:cxnSp>
+        <p:nvCxnSpPr>
+          <p:cNvPr id="17" name="Straight Arrow Connector 16">
+            <a:extLst>
+              <a:ext uri="{FF2B5EF4-FFF2-40B4-BE49-F238E27FC236}">
+                <a16:creationId xmlns:a16="http://schemas.microsoft.com/office/drawing/2014/main" id="{FCCD6220-64D9-8441-7BEB-278482A78256}"/>
+              </a:ext>
+            </a:extLst>
+          </p:cNvPr>
+          <p:cNvCxnSpPr/>
+          <p:nvPr/>
+        </p:nvCxnSpPr>
+        <p:spPr>
+          <a:xfrm flipH="1" flipV="1">
+            <a:off x="9269643" y="956281"/>
+            <a:ext cx="858121" cy="76782"/>
+          </a:xfrm>
+          <a:prstGeom prst="straightConnector1">
+            <a:avLst/>
+          </a:prstGeom>
+          <a:ln w="57150">
+            <a:solidFill>
+              <a:srgbClr val="FF0000"/>
+            </a:solidFill>
+            <a:tailEnd type="triangle"/>
+          </a:ln>
+        </p:spPr>
+        <p:style>
+          <a:lnRef idx="1">
+            <a:schemeClr val="accent1"/>
+          </a:lnRef>
+          <a:fillRef idx="0">
+            <a:schemeClr val="accent1"/>
+          </a:fillRef>
+          <a:effectRef idx="0">
+            <a:schemeClr val="accent1"/>
+          </a:effectRef>
+          <a:fontRef idx="minor">
+            <a:schemeClr val="tx1"/>
+          </a:fontRef>
+        </p:style>
+      </p:cxnSp>
+      <p:cxnSp>
+        <p:nvCxnSpPr>
+          <p:cNvPr id="18" name="Straight Arrow Connector 17">
+            <a:extLst>
+              <a:ext uri="{FF2B5EF4-FFF2-40B4-BE49-F238E27FC236}">
+                <a16:creationId xmlns:a16="http://schemas.microsoft.com/office/drawing/2014/main" id="{B4D9D787-D1DC-96DC-46C1-5E524C70E267}"/>
+              </a:ext>
+            </a:extLst>
+          </p:cNvPr>
+          <p:cNvCxnSpPr>
+            <a:cxnSpLocks/>
+          </p:cNvCxnSpPr>
+          <p:nvPr/>
+        </p:nvCxnSpPr>
+        <p:spPr>
+          <a:xfrm flipH="1">
+            <a:off x="9346424" y="1033063"/>
+            <a:ext cx="781340" cy="152400"/>
+          </a:xfrm>
+          <a:prstGeom prst="straightConnector1">
+            <a:avLst/>
+          </a:prstGeom>
+          <a:ln w="57150">
+            <a:solidFill>
+              <a:srgbClr val="FF0000"/>
+            </a:solidFill>
+            <a:tailEnd type="triangle"/>
+          </a:ln>
+        </p:spPr>
+        <p:style>
+          <a:lnRef idx="1">
+            <a:schemeClr val="accent1"/>
+          </a:lnRef>
+          <a:fillRef idx="0">
+            <a:schemeClr val="accent1"/>
+          </a:fillRef>
+          <a:effectRef idx="0">
+            <a:schemeClr val="accent1"/>
+          </a:effectRef>
+          <a:fontRef idx="minor">
+            <a:schemeClr val="tx1"/>
+          </a:fontRef>
+        </p:style>
+      </p:cxnSp>
+      <p:cxnSp>
+        <p:nvCxnSpPr>
+          <p:cNvPr id="21" name="Straight Arrow Connector 20">
+            <a:extLst>
+              <a:ext uri="{FF2B5EF4-FFF2-40B4-BE49-F238E27FC236}">
+                <a16:creationId xmlns:a16="http://schemas.microsoft.com/office/drawing/2014/main" id="{A1C7C296-F1FA-BEE7-7AEC-FAEC910A1DE4}"/>
+              </a:ext>
+            </a:extLst>
+          </p:cNvPr>
+          <p:cNvCxnSpPr>
+            <a:cxnSpLocks/>
+          </p:cNvCxnSpPr>
+          <p:nvPr/>
+        </p:nvCxnSpPr>
+        <p:spPr>
+          <a:xfrm flipH="1">
+            <a:off x="9346424" y="1033063"/>
+            <a:ext cx="781340" cy="443857"/>
+          </a:xfrm>
+          <a:prstGeom prst="straightConnector1">
+            <a:avLst/>
+          </a:prstGeom>
+          <a:ln w="57150">
+            <a:solidFill>
+              <a:srgbClr val="FF0000"/>
+            </a:solidFill>
+            <a:tailEnd type="triangle"/>
+          </a:ln>
+        </p:spPr>
+        <p:style>
+          <a:lnRef idx="1">
+            <a:schemeClr val="accent1"/>
+          </a:lnRef>
+          <a:fillRef idx="0">
+            <a:schemeClr val="accent1"/>
+          </a:fillRef>
+          <a:effectRef idx="0">
+            <a:schemeClr val="accent1"/>
+          </a:effectRef>
+          <a:fontRef idx="minor">
+            <a:schemeClr val="tx1"/>
+          </a:fontRef>
+        </p:style>
+      </p:cxnSp>
+    </p:spTree>
+    <p:extLst>
+      <p:ext uri="{BB962C8B-B14F-4D97-AF65-F5344CB8AC3E}">
+        <p14:creationId xmlns:p14="http://schemas.microsoft.com/office/powerpoint/2010/main" val="245864034"/>
+      </p:ext>
+    </p:extLst>
+  </p:cSld>
+  <p:clrMapOvr>
+    <a:masterClrMapping/>
+  </p:clrMapOvr>
+</p:sld>
+</file>
+
 <file path=ppt/theme/theme1.xml><?xml version="1.0" encoding="utf-8"?>
 <a:theme xmlns:a="http://schemas.openxmlformats.org/drawingml/2006/main" name="Office Theme">
   <a:themeElements>

</xml_diff>